<commit_message>
slight changes to powerpoint
</commit_message>
<xml_diff>
--- a/The OfficePPT.pptx
+++ b/The OfficePPT.pptx
@@ -115,10 +115,6 @@
     </p:ext>
   </p:extLst>
 </p:presentation>
-</file>
-
-<file path=ppt/revisionInfo.xml><?xml version="1.0" encoding="utf-8"?>
-<p1510:revInfo xmlns:a="http://schemas.openxmlformats.org/drawingml/2006/main" xmlns:r="http://schemas.openxmlformats.org/officeDocument/2006/relationships" xmlns:p1510="http://schemas.microsoft.com/office/powerpoint/2015/10/main"/>
 </file>
 
 <file path=ppt/slideLayouts/slideLayout1.xml><?xml version="1.0" encoding="utf-8"?>
@@ -3967,7 +3963,7 @@
             <a:pPr algn="ctr"/>
             <a:r>
               <a:rPr lang="en-US" dirty="0"/>
-              <a:t>Standards used in our project</a:t>
+              <a:t>Assets used in the project</a:t>
             </a:r>
           </a:p>
         </p:txBody>
@@ -3985,35 +3981,25 @@
         <p:spPr/>
         <p:txBody>
           <a:bodyPr>
-            <a:normAutofit fontScale="92500" lnSpcReduction="10000"/>
+            <a:normAutofit/>
           </a:bodyPr>
           <a:lstStyle/>
           <a:p>
             <a:r>
               <a:rPr lang="en-US" sz="4200" dirty="0"/>
-              <a:t>Using GitHub to save our project so that the team can work together</a:t>
+              <a:t>Use of GitHub for team collaboration</a:t>
             </a:r>
           </a:p>
           <a:p>
             <a:r>
               <a:rPr lang="en-US" sz="4200" dirty="0"/>
-              <a:t>Using </a:t>
+              <a:t>Database cloud-hosted on </a:t>
             </a:r>
             <a:r>
               <a:rPr lang="en-US" sz="4200" dirty="0" err="1"/>
               <a:t>GearHost</a:t>
             </a:r>
-            <a:r>
-              <a:rPr lang="en-US" sz="4200" dirty="0"/>
-              <a:t> to save our database on the cloud so that the team can </a:t>
-            </a:r>
-            <a:br>
-              <a:rPr lang="en-US" sz="4200" dirty="0"/>
-            </a:br>
-            <a:r>
-              <a:rPr lang="en-US" sz="4200" dirty="0"/>
-              <a:t>have access to the same data</a:t>
-            </a:r>
+            <a:endParaRPr lang="en-US" sz="4200" dirty="0"/>
           </a:p>
           <a:p>
             <a:r>
@@ -4083,9 +4069,10 @@
           <a:bodyPr/>
           <a:lstStyle/>
           <a:p>
+            <a:pPr algn="ctr"/>
             <a:r>
               <a:rPr lang="en-US" dirty="0"/>
-              <a:t>Standards used in our project</a:t>
+              <a:t>Assets used in the project (contd.)</a:t>
             </a:r>
           </a:p>
         </p:txBody>
@@ -4113,7 +4100,7 @@
           <a:p>
             <a:r>
               <a:rPr lang="en-US" sz="3600" dirty="0"/>
-              <a:t>Using JDBC API</a:t>
+              <a:t>JDBC API for database connectivity and access</a:t>
             </a:r>
           </a:p>
           <a:p>
@@ -4125,7 +4112,7 @@
           <a:p>
             <a:r>
               <a:rPr lang="en-US" sz="3600" dirty="0"/>
-              <a:t>Using MySQL Database</a:t>
+              <a:t>MySQL Database</a:t>
             </a:r>
           </a:p>
           <a:p>
@@ -4351,40 +4338,37 @@
           <a:p>
             <a:r>
               <a:rPr lang="en-US" sz="3600" dirty="0"/>
-              <a:t>How to implement MVC architecture</a:t>
+              <a:t>Implementing MVC architecture</a:t>
             </a:r>
           </a:p>
           <a:p>
             <a:r>
               <a:rPr lang="en-US" sz="3600" dirty="0"/>
-              <a:t>How to implement login/logout</a:t>
+              <a:t>Login/Logout and user role functionality</a:t>
             </a:r>
           </a:p>
           <a:p>
             <a:r>
               <a:rPr lang="en-US" sz="3600" dirty="0"/>
-              <a:t>How to use Sessions</a:t>
+              <a:t>User sessions</a:t>
             </a:r>
           </a:p>
           <a:p>
             <a:r>
               <a:rPr lang="en-US" sz="3600" dirty="0"/>
-              <a:t>How to implement Search</a:t>
+              <a:t>Implementing a search function</a:t>
             </a:r>
           </a:p>
           <a:p>
             <a:r>
               <a:rPr lang="en-US" sz="3600" dirty="0"/>
-              <a:t>How </a:t>
+              <a:t>Using includes to keep </a:t>
             </a:r>
             <a:r>
               <a:rPr lang="en-US" sz="3600"/>
-              <a:t>to use </a:t>
-            </a:r>
-            <a:r>
-              <a:rPr lang="en-US" sz="3600" dirty="0"/>
-              <a:t>include for consistent layout</a:t>
-            </a:r>
+              <a:t>layout consistent</a:t>
+            </a:r>
+            <a:endParaRPr lang="en-US" sz="3600" dirty="0"/>
           </a:p>
           <a:p>
             <a:endParaRPr lang="en-US" sz="3600" dirty="0"/>

</xml_diff>